<commit_message>
Fixed pptx and export the table as a png
</commit_message>
<xml_diff>
--- a/Risk Assessment.pptx
+++ b/Risk Assessment.pptx
@@ -104,6 +104,11 @@
       </a:defRPr>
     </a:lvl9pPr>
   </p:defaultTextStyle>
+  <p:extLst>
+    <p:ext uri="{EFAFB233-063F-42B5-8137-9DF3F51BA10A}">
+      <p15:sldGuideLst xmlns:p15="http://schemas.microsoft.com/office/powerpoint/2012/main"/>
+    </p:ext>
+  </p:extLst>
 </p:presentation>
 </file>
 
@@ -254,7 +259,7 @@
           <a:p>
             <a:fld id="{279DC052-28AC-40BE-A764-EB6F76DB3F8B}" type="datetimeFigureOut">
               <a:rPr lang="he-IL" smtClean="0"/>
-              <a:t>ל'/ניסן/תשפ"א</a:t>
+              <a:t>א'/אייר/תשפ"א</a:t>
             </a:fld>
             <a:endParaRPr lang="he-IL"/>
           </a:p>
@@ -452,7 +457,7 @@
           <a:p>
             <a:fld id="{279DC052-28AC-40BE-A764-EB6F76DB3F8B}" type="datetimeFigureOut">
               <a:rPr lang="he-IL" smtClean="0"/>
-              <a:t>ל'/ניסן/תשפ"א</a:t>
+              <a:t>א'/אייר/תשפ"א</a:t>
             </a:fld>
             <a:endParaRPr lang="he-IL"/>
           </a:p>
@@ -660,7 +665,7 @@
           <a:p>
             <a:fld id="{279DC052-28AC-40BE-A764-EB6F76DB3F8B}" type="datetimeFigureOut">
               <a:rPr lang="he-IL" smtClean="0"/>
-              <a:t>ל'/ניסן/תשפ"א</a:t>
+              <a:t>א'/אייר/תשפ"א</a:t>
             </a:fld>
             <a:endParaRPr lang="he-IL"/>
           </a:p>
@@ -858,7 +863,7 @@
           <a:p>
             <a:fld id="{279DC052-28AC-40BE-A764-EB6F76DB3F8B}" type="datetimeFigureOut">
               <a:rPr lang="he-IL" smtClean="0"/>
-              <a:t>ל'/ניסן/תשפ"א</a:t>
+              <a:t>א'/אייר/תשפ"א</a:t>
             </a:fld>
             <a:endParaRPr lang="he-IL"/>
           </a:p>
@@ -1133,7 +1138,7 @@
           <a:p>
             <a:fld id="{279DC052-28AC-40BE-A764-EB6F76DB3F8B}" type="datetimeFigureOut">
               <a:rPr lang="he-IL" smtClean="0"/>
-              <a:t>ל'/ניסן/תשפ"א</a:t>
+              <a:t>א'/אייר/תשפ"א</a:t>
             </a:fld>
             <a:endParaRPr lang="he-IL"/>
           </a:p>
@@ -1398,7 +1403,7 @@
           <a:p>
             <a:fld id="{279DC052-28AC-40BE-A764-EB6F76DB3F8B}" type="datetimeFigureOut">
               <a:rPr lang="he-IL" smtClean="0"/>
-              <a:t>ל'/ניסן/תשפ"א</a:t>
+              <a:t>א'/אייר/תשפ"א</a:t>
             </a:fld>
             <a:endParaRPr lang="he-IL"/>
           </a:p>
@@ -1810,7 +1815,7 @@
           <a:p>
             <a:fld id="{279DC052-28AC-40BE-A764-EB6F76DB3F8B}" type="datetimeFigureOut">
               <a:rPr lang="he-IL" smtClean="0"/>
-              <a:t>ל'/ניסן/תשפ"א</a:t>
+              <a:t>א'/אייר/תשפ"א</a:t>
             </a:fld>
             <a:endParaRPr lang="he-IL"/>
           </a:p>
@@ -1951,7 +1956,7 @@
           <a:p>
             <a:fld id="{279DC052-28AC-40BE-A764-EB6F76DB3F8B}" type="datetimeFigureOut">
               <a:rPr lang="he-IL" smtClean="0"/>
-              <a:t>ל'/ניסן/תשפ"א</a:t>
+              <a:t>א'/אייר/תשפ"א</a:t>
             </a:fld>
             <a:endParaRPr lang="he-IL"/>
           </a:p>
@@ -2064,7 +2069,7 @@
           <a:p>
             <a:fld id="{279DC052-28AC-40BE-A764-EB6F76DB3F8B}" type="datetimeFigureOut">
               <a:rPr lang="he-IL" smtClean="0"/>
-              <a:t>ל'/ניסן/תשפ"א</a:t>
+              <a:t>א'/אייר/תשפ"א</a:t>
             </a:fld>
             <a:endParaRPr lang="he-IL"/>
           </a:p>
@@ -2375,7 +2380,7 @@
           <a:p>
             <a:fld id="{279DC052-28AC-40BE-A764-EB6F76DB3F8B}" type="datetimeFigureOut">
               <a:rPr lang="he-IL" smtClean="0"/>
-              <a:t>ל'/ניסן/תשפ"א</a:t>
+              <a:t>א'/אייר/תשפ"א</a:t>
             </a:fld>
             <a:endParaRPr lang="he-IL"/>
           </a:p>
@@ -2663,7 +2668,7 @@
           <a:p>
             <a:fld id="{279DC052-28AC-40BE-A764-EB6F76DB3F8B}" type="datetimeFigureOut">
               <a:rPr lang="he-IL" smtClean="0"/>
-              <a:t>ל'/ניסן/תשפ"א</a:t>
+              <a:t>א'/אייר/תשפ"א</a:t>
             </a:fld>
             <a:endParaRPr lang="he-IL"/>
           </a:p>
@@ -2904,7 +2909,7 @@
           <a:p>
             <a:fld id="{279DC052-28AC-40BE-A764-EB6F76DB3F8B}" type="datetimeFigureOut">
               <a:rPr lang="he-IL" smtClean="0"/>
-              <a:t>ל'/ניסן/תשפ"א</a:t>
+              <a:t>א'/אייר/תשפ"א</a:t>
             </a:fld>
             <a:endParaRPr lang="he-IL"/>
           </a:p>
@@ -3336,7 +3341,7 @@
           <p:nvPr>
             <p:extLst>
               <p:ext uri="{D42A27DB-BD31-4B8C-83A1-F6EECF244321}">
-                <p14:modId xmlns:p14="http://schemas.microsoft.com/office/powerpoint/2010/main" val="2894037048"/>
+                <p14:modId xmlns:p14="http://schemas.microsoft.com/office/powerpoint/2010/main" val="2287402382"/>
               </p:ext>
             </p:extLst>
           </p:nvPr>
@@ -4346,7 +4351,7 @@
                           <a:effectLst/>
                           <a:latin typeface="Tahoma" panose="020B0604030504040204" pitchFamily="34" charset="0"/>
                         </a:rPr>
-                        <a:t>H</a:t>
+                        <a:t>H </a:t>
                       </a:r>
                     </a:p>
                   </a:txBody>
@@ -4460,11 +4465,18 @@
                     <a:p>
                       <a:pPr algn="ctr" fontAlgn="t"/>
                       <a:r>
+                        <a:rPr lang="en-GB" sz="1600" b="1" i="0" u="none" strike="noStrike" dirty="0">
+                          <a:effectLst/>
+                          <a:latin typeface="Tahoma" panose="020B0604030504040204" pitchFamily="34" charset="0"/>
+                        </a:rPr>
+                        <a:t>C</a:t>
+                      </a:r>
+                      <a:r>
                         <a:rPr lang="en-US" sz="1600" b="1" i="0" u="none" strike="noStrike" dirty="0">
                           <a:effectLst/>
                           <a:latin typeface="Tahoma" panose="020B0604030504040204" pitchFamily="34" charset="0"/>
                         </a:rPr>
-                        <a:t>Corona</a:t>
+                        <a:t>OVID - 19</a:t>
                       </a:r>
                     </a:p>
                   </a:txBody>
@@ -5084,7 +5096,7 @@
                           <a:effectLst/>
                           <a:latin typeface="Tahoma" panose="020B0604030504040204" pitchFamily="34" charset="0"/>
                         </a:rPr>
-                        <a:t> New requirements, Changes</a:t>
+                        <a:t> New requirements or changes</a:t>
                       </a:r>
                     </a:p>
                   </a:txBody>
@@ -5670,8 +5682,19 @@
                           <a:effectLst/>
                           <a:latin typeface="Tahoma" panose="020B0604030504040204" pitchFamily="34" charset="0"/>
                         </a:rPr>
-                        <a:t>The will be now allowed on them</a:t>
+                        <a:t>Will the application be approved for publication</a:t>
                       </a:r>
+                      <a:r>
+                        <a:rPr lang="en-GB" sz="1600" b="0" i="0" u="none" strike="noStrike" dirty="0">
+                          <a:effectLst/>
+                          <a:latin typeface="Tahoma" panose="020B0604030504040204" pitchFamily="34" charset="0"/>
+                        </a:rPr>
+                        <a:t> on each platform</a:t>
+                      </a:r>
+                      <a:endParaRPr lang="en-US" sz="1600" b="0" i="0" u="none" strike="noStrike" dirty="0">
+                        <a:effectLst/>
+                        <a:latin typeface="Tahoma" panose="020B0604030504040204" pitchFamily="34" charset="0"/>
+                      </a:endParaRPr>
                     </a:p>
                   </a:txBody>
                   <a:tcPr marL="0" marR="0" marT="0" marB="0">
@@ -5896,7 +5919,7 @@
                           <a:effectLst/>
                           <a:latin typeface="Tahoma" panose="020B0604030504040204" pitchFamily="34" charset="0"/>
                         </a:rPr>
-                        <a:t>Versions control</a:t>
+                        <a:t>Version control</a:t>
                       </a:r>
                     </a:p>
                   </a:txBody>
@@ -5953,7 +5976,7 @@
                           <a:effectLst/>
                           <a:latin typeface="Tahoma" panose="020B0604030504040204" pitchFamily="34" charset="0"/>
                         </a:rPr>
-                        <a:t> Run over a different versions </a:t>
+                        <a:t> Run over different versions </a:t>
                       </a:r>
                     </a:p>
                   </a:txBody>

</xml_diff>